<commit_message>
Making final updates to powerpoint for presentation.
</commit_message>
<xml_diff>
--- a/Exploring Various Optimizers (1).pptx
+++ b/Exploring Various Optimizers (1).pptx
@@ -204,7 +204,7 @@
           <a:p>
             <a:fld id="{B9AED1CD-FFCA-6D46-945E-1D85210D1629}" type="datetimeFigureOut">
               <a:rPr lang="en-US" smtClean="0"/>
-              <a:t>2/17/21</a:t>
+              <a:t>2/18/21</a:t>
             </a:fld>
             <a:endParaRPr lang="en-US"/>
           </a:p>
@@ -705,7 +705,7 @@
           <a:p>
             <a:fld id="{56A52D25-D451-6546-A13E-628912A9C647}" type="datetimeFigureOut">
               <a:rPr lang="en-US" smtClean="0"/>
-              <a:t>2/17/21</a:t>
+              <a:t>2/18/21</a:t>
             </a:fld>
             <a:endParaRPr lang="en-US"/>
           </a:p>
@@ -903,7 +903,7 @@
           <a:p>
             <a:fld id="{56A52D25-D451-6546-A13E-628912A9C647}" type="datetimeFigureOut">
               <a:rPr lang="en-US" smtClean="0"/>
-              <a:t>2/17/21</a:t>
+              <a:t>2/18/21</a:t>
             </a:fld>
             <a:endParaRPr lang="en-US"/>
           </a:p>
@@ -1111,7 +1111,7 @@
           <a:p>
             <a:fld id="{56A52D25-D451-6546-A13E-628912A9C647}" type="datetimeFigureOut">
               <a:rPr lang="en-US" smtClean="0"/>
-              <a:t>2/17/21</a:t>
+              <a:t>2/18/21</a:t>
             </a:fld>
             <a:endParaRPr lang="en-US"/>
           </a:p>
@@ -1309,7 +1309,7 @@
           <a:p>
             <a:fld id="{56A52D25-D451-6546-A13E-628912A9C647}" type="datetimeFigureOut">
               <a:rPr lang="en-US" smtClean="0"/>
-              <a:t>2/17/21</a:t>
+              <a:t>2/18/21</a:t>
             </a:fld>
             <a:endParaRPr lang="en-US"/>
           </a:p>
@@ -1584,7 +1584,7 @@
           <a:p>
             <a:fld id="{56A52D25-D451-6546-A13E-628912A9C647}" type="datetimeFigureOut">
               <a:rPr lang="en-US" smtClean="0"/>
-              <a:t>2/17/21</a:t>
+              <a:t>2/18/21</a:t>
             </a:fld>
             <a:endParaRPr lang="en-US"/>
           </a:p>
@@ -1849,7 +1849,7 @@
           <a:p>
             <a:fld id="{56A52D25-D451-6546-A13E-628912A9C647}" type="datetimeFigureOut">
               <a:rPr lang="en-US" smtClean="0"/>
-              <a:t>2/17/21</a:t>
+              <a:t>2/18/21</a:t>
             </a:fld>
             <a:endParaRPr lang="en-US"/>
           </a:p>
@@ -2261,7 +2261,7 @@
           <a:p>
             <a:fld id="{56A52D25-D451-6546-A13E-628912A9C647}" type="datetimeFigureOut">
               <a:rPr lang="en-US" smtClean="0"/>
-              <a:t>2/17/21</a:t>
+              <a:t>2/18/21</a:t>
             </a:fld>
             <a:endParaRPr lang="en-US"/>
           </a:p>
@@ -2402,7 +2402,7 @@
           <a:p>
             <a:fld id="{56A52D25-D451-6546-A13E-628912A9C647}" type="datetimeFigureOut">
               <a:rPr lang="en-US" smtClean="0"/>
-              <a:t>2/17/21</a:t>
+              <a:t>2/18/21</a:t>
             </a:fld>
             <a:endParaRPr lang="en-US"/>
           </a:p>
@@ -2515,7 +2515,7 @@
           <a:p>
             <a:fld id="{56A52D25-D451-6546-A13E-628912A9C647}" type="datetimeFigureOut">
               <a:rPr lang="en-US" smtClean="0"/>
-              <a:t>2/17/21</a:t>
+              <a:t>2/18/21</a:t>
             </a:fld>
             <a:endParaRPr lang="en-US"/>
           </a:p>
@@ -2826,7 +2826,7 @@
           <a:p>
             <a:fld id="{56A52D25-D451-6546-A13E-628912A9C647}" type="datetimeFigureOut">
               <a:rPr lang="en-US" smtClean="0"/>
-              <a:t>2/17/21</a:t>
+              <a:t>2/18/21</a:t>
             </a:fld>
             <a:endParaRPr lang="en-US"/>
           </a:p>
@@ -3114,7 +3114,7 @@
           <a:p>
             <a:fld id="{56A52D25-D451-6546-A13E-628912A9C647}" type="datetimeFigureOut">
               <a:rPr lang="en-US" smtClean="0"/>
-              <a:t>2/17/21</a:t>
+              <a:t>2/18/21</a:t>
             </a:fld>
             <a:endParaRPr lang="en-US"/>
           </a:p>
@@ -3355,7 +3355,7 @@
           <a:p>
             <a:fld id="{56A52D25-D451-6546-A13E-628912A9C647}" type="datetimeFigureOut">
               <a:rPr lang="en-US" smtClean="0"/>
-              <a:t>2/17/21</a:t>
+              <a:t>2/18/21</a:t>
             </a:fld>
             <a:endParaRPr lang="en-US"/>
           </a:p>
@@ -3855,8 +3855,8 @@
           <p:nvPr/>
         </p:nvSpPr>
         <p:spPr>
-          <a:xfrm>
-            <a:off x="5160605" y="6282353"/>
+          <a:xfrm rot="16200000">
+            <a:off x="1459487" y="4029271"/>
             <a:ext cx="1491114" cy="261610"/>
           </a:xfrm>
           <a:prstGeom prst="rect">
@@ -3871,15 +3871,7 @@
           <a:p>
             <a:r>
               <a:rPr lang="en-US" sz="1100" dirty="0"/>
-              <a:t>https://</a:t>
-            </a:r>
-            <a:r>
-              <a:rPr lang="en-US" sz="1100" dirty="0" err="1"/>
-              <a:t>xkcd.com</a:t>
-            </a:r>
-            <a:r>
-              <a:rPr lang="en-US" sz="1100" dirty="0"/>
-              <a:t>/720/</a:t>
+              <a:t>https://xkcd.com/720/</a:t>
             </a:r>
           </a:p>
         </p:txBody>
@@ -4088,41 +4080,6 @@
           </a:p>
         </p:txBody>
       </p:sp>
-      <p:sp>
-        <p:nvSpPr>
-          <p:cNvPr id="5" name="Content Placeholder 4">
-            <a:extLst>
-              <a:ext uri="{FF2B5EF4-FFF2-40B4-BE49-F238E27FC236}">
-                <a16:creationId xmlns:a16="http://schemas.microsoft.com/office/drawing/2014/main" id="{E8676FD2-6B07-9146-8A57-446B87700536}"/>
-              </a:ext>
-            </a:extLst>
-          </p:cNvPr>
-          <p:cNvSpPr>
-            <a:spLocks noGrp="1"/>
-          </p:cNvSpPr>
-          <p:nvPr>
-            <p:ph idx="1"/>
-          </p:nvPr>
-        </p:nvSpPr>
-        <p:spPr>
-          <a:xfrm>
-            <a:off x="640230" y="3852635"/>
-            <a:ext cx="5177943" cy="2298532"/>
-          </a:xfrm>
-        </p:spPr>
-        <p:txBody>
-          <a:bodyPr>
-            <a:normAutofit/>
-          </a:bodyPr>
-          <a:lstStyle/>
-          <a:p>
-            <a:pPr marL="0" indent="0">
-              <a:buNone/>
-            </a:pPr>
-            <a:endParaRPr lang="en-US" sz="1800" dirty="0"/>
-          </a:p>
-        </p:txBody>
-      </p:sp>
       <p:pic>
         <p:nvPicPr>
           <p:cNvPr id="15" name="Picture 14" descr="Chart, line chart&#10;&#10;Description automatically generated">
@@ -4145,7 +4102,7 @@
         </p:blipFill>
         <p:spPr>
           <a:xfrm>
-            <a:off x="5955738" y="3738521"/>
+            <a:off x="3041255" y="3713808"/>
             <a:ext cx="6109487" cy="2548992"/>
           </a:xfrm>
           <a:prstGeom prst="rect">
@@ -4235,7 +4192,7 @@
           <p:nvPr>
             <p:extLst>
               <p:ext uri="{D42A27DB-BD31-4B8C-83A1-F6EECF244321}">
-                <p14:modId xmlns:p14="http://schemas.microsoft.com/office/powerpoint/2010/main" val="4185339340"/>
+                <p14:modId xmlns:p14="http://schemas.microsoft.com/office/powerpoint/2010/main" val="3109200079"/>
               </p:ext>
             </p:extLst>
           </p:nvPr>
@@ -4901,7 +4858,7 @@
                           <a:ea typeface="+mn-ea"/>
                           <a:cs typeface="+mn-cs"/>
                         </a:rPr>
-                        <a:t>PuLP is an LP modeler written in Python to solve linear problems.</a:t>
+                        <a:t>PuLP is a linear programming (LP) package written in Python to solve linear problems.</a:t>
                       </a:r>
                     </a:p>
                   </a:txBody>
@@ -5699,13 +5656,13 @@
         </p:nvSpPr>
         <p:spPr>
           <a:xfrm>
-            <a:off x="4376808" y="1716196"/>
-            <a:ext cx="7570966" cy="4004982"/>
+            <a:off x="4330068" y="1450161"/>
+            <a:ext cx="7570966" cy="4525278"/>
           </a:xfrm>
         </p:spPr>
         <p:txBody>
           <a:bodyPr>
-            <a:normAutofit/>
+            <a:normAutofit lnSpcReduction="10000"/>
           </a:bodyPr>
           <a:lstStyle/>
           <a:p>
@@ -5793,7 +5750,18 @@
             </a:pPr>
             <a:r>
               <a:rPr lang="en-US" sz="1800" dirty="0"/>
-              <a:t>Since this is a constrained optimization technique, so you must specify the bounds for each parameter for it to work</a:t>
+              <a:t>Since this is a constrained optimization technique, you must specify the bounds for each parameter for it to work</a:t>
+            </a:r>
+          </a:p>
+          <a:p>
+            <a:pPr marL="228600" lvl="1">
+              <a:spcBef>
+                <a:spcPts val="1000"/>
+              </a:spcBef>
+            </a:pPr>
+            <a:r>
+              <a:rPr lang="en-US" sz="1800" dirty="0"/>
+              <a:t>The processing time can be longer if the user chooses to tune the hyper-parameters to obtain more accuracy in the output</a:t>
             </a:r>
           </a:p>
           <a:p>
@@ -6292,13 +6260,19 @@
             <p:ph type="title"/>
           </p:nvPr>
         </p:nvSpPr>
-        <p:spPr/>
+        <p:spPr>
+          <a:xfrm>
+            <a:off x="838200" y="365126"/>
+            <a:ext cx="10515600" cy="833480"/>
+          </a:xfrm>
+        </p:spPr>
         <p:txBody>
           <a:bodyPr>
             <a:normAutofit/>
           </a:bodyPr>
           <a:lstStyle/>
           <a:p>
+            <a:pPr algn="ctr"/>
             <a:r>
               <a:rPr lang="en-US" b="1" dirty="0"/>
               <a:t>Next Steps</a:t>
@@ -6336,15 +6310,7 @@
           <a:p>
             <a:r>
               <a:rPr lang="en-US" dirty="0"/>
-              <a:t>Choose a simple </a:t>
-            </a:r>
-            <a:r>
-              <a:rPr lang="en-US"/>
-              <a:t>function trying </a:t>
-            </a:r>
-            <a:r>
-              <a:rPr lang="en-US" dirty="0"/>
-              <a:t>all the packages and see what will be the results in terms of optimal answer and time complexity </a:t>
+              <a:t>Choose a simple function trying all the packages and see what will be the results in terms of optimal answer and time complexity </a:t>
             </a:r>
           </a:p>
           <a:p>

</xml_diff>

<commit_message>
Updating with minor changes to the presentation.
</commit_message>
<xml_diff>
--- a/Exploring Various Optimizers (1).pptx
+++ b/Exploring Various Optimizers (1).pptx
@@ -5,7 +5,7 @@
     <p:sldMasterId id="2147483648" r:id="rId1"/>
   </p:sldMasterIdLst>
   <p:notesMasterIdLst>
-    <p:notesMasterId r:id="rId10"/>
+    <p:notesMasterId r:id="rId9"/>
   </p:notesMasterIdLst>
   <p:sldIdLst>
     <p:sldId id="256" r:id="rId2"/>
@@ -13,9 +13,8 @@
     <p:sldId id="263" r:id="rId4"/>
     <p:sldId id="260" r:id="rId5"/>
     <p:sldId id="264" r:id="rId6"/>
-    <p:sldId id="268" r:id="rId7"/>
-    <p:sldId id="265" r:id="rId8"/>
-    <p:sldId id="266" r:id="rId9"/>
+    <p:sldId id="265" r:id="rId7"/>
+    <p:sldId id="266" r:id="rId8"/>
   </p:sldIdLst>
   <p:sldSz cx="12192000" cy="6858000"/>
   <p:notesSz cx="6858000" cy="9144000"/>
@@ -5656,91 +5655,72 @@
         </p:nvSpPr>
         <p:spPr>
           <a:xfrm>
-            <a:off x="4330068" y="1450161"/>
-            <a:ext cx="7570966" cy="4525278"/>
+            <a:off x="4330068" y="1398109"/>
+            <a:ext cx="7570966" cy="5021079"/>
           </a:xfrm>
         </p:spPr>
         <p:txBody>
           <a:bodyPr>
-            <a:normAutofit lnSpcReduction="10000"/>
+            <a:normAutofit/>
           </a:bodyPr>
           <a:lstStyle/>
           <a:p>
             <a:r>
               <a:rPr lang="en-US" sz="1800" dirty="0"/>
-              <a:t>This is a </a:t>
-            </a:r>
-            <a:r>
-              <a:rPr lang="en-US" sz="1800" b="1" u="sng" dirty="0"/>
-              <a:t>constrained global optimization</a:t>
-            </a:r>
-            <a:r>
-              <a:rPr lang="en-US" sz="1800" b="1" dirty="0"/>
-              <a:t> </a:t>
-            </a:r>
-            <a:r>
-              <a:rPr lang="en-US" sz="1800" dirty="0"/>
-              <a:t>package built upon Bayesian inference and Gaussian process.</a:t>
+              <a:t>The core question in Bayesian Optimization is: “Based on what we know so far, which point should we evaluate next?” The process of selecting the next point to evaluate is very important since this can be a very costly process</a:t>
             </a:r>
           </a:p>
           <a:p>
             <a:pPr lvl="1"/>
             <a:r>
-              <a:rPr lang="en-US" sz="1400" b="1" u="sng" dirty="0"/>
-              <a:t>Constrained global optimization </a:t>
-            </a:r>
-            <a:r>
-              <a:rPr lang="en-US" sz="1400" dirty="0"/>
-              <a:t>- process of optimizing an objective function with respect to some variables in the presence of constraints on those variables</a:t>
+              <a:rPr lang="en-US" sz="1600" b="1" u="sng" dirty="0"/>
+              <a:t>Example</a:t>
+            </a:r>
+            <a:r>
+              <a:rPr lang="en-US" sz="1600" b="1" dirty="0"/>
+              <a:t>: </a:t>
+            </a:r>
+            <a:r>
+              <a:rPr lang="en-US" sz="1600" dirty="0"/>
+              <a:t>Drilling for oil, testing each location may cost $1 million or more</a:t>
             </a:r>
           </a:p>
           <a:p>
             <a:pPr marL="457200" lvl="1" indent="0">
               <a:buNone/>
             </a:pPr>
-            <a:endParaRPr lang="en-US" sz="1100" dirty="0"/>
+            <a:endParaRPr lang="en-US" sz="1600" dirty="0"/>
           </a:p>
           <a:p>
             <a:r>
               <a:rPr lang="en-US" sz="1800" dirty="0"/>
-              <a:t>It attempts to find the maximum or minimum value of a function in as few iterations as possible. </a:t>
+              <a:t>Bayes_Opt uses Gaussian processes to construct a posterior distribution of functions that best describes the function the user wishes to optimize.</a:t>
             </a:r>
           </a:p>
           <a:p>
             <a:pPr marL="0" indent="0">
               <a:buNone/>
             </a:pPr>
-            <a:endParaRPr lang="en-US" sz="1100" dirty="0"/>
+            <a:endParaRPr lang="en-US" sz="1800" dirty="0"/>
           </a:p>
           <a:p>
             <a:r>
               <a:rPr lang="en-US" sz="1800" dirty="0"/>
-              <a:t>This is particularly useful for optimization of high-cost functions or situations where the balance between exploration and exploitation is important.</a:t>
+              <a:t>This distribution improves and the algorithm becomes more confident of which regions to explore as the number of observations grows.</a:t>
             </a:r>
           </a:p>
           <a:p>
             <a:pPr lvl="1"/>
             <a:r>
-              <a:rPr lang="en-US" sz="1400" b="1" u="sng" dirty="0"/>
-              <a:t>Example</a:t>
-            </a:r>
-            <a:r>
-              <a:rPr lang="en-US" sz="1400" b="1" dirty="0"/>
-              <a:t>: </a:t>
-            </a:r>
-            <a:r>
-              <a:rPr lang="en-US" sz="1400" dirty="0"/>
-              <a:t>Drilling for oil, testing each location may cost $1 million or more</a:t>
-            </a:r>
-          </a:p>
-          <a:p>
-            <a:pPr marL="0" lvl="1" indent="0">
-              <a:spcBef>
-                <a:spcPts val="1000"/>
-              </a:spcBef>
+              <a:rPr lang="en-US" sz="1600" dirty="0"/>
+              <a:t>It uses an acquisition function to balance between exploration and exploitation</a:t>
+            </a:r>
+          </a:p>
+          <a:p>
+            <a:pPr marL="457200" lvl="1" indent="0">
               <a:buNone/>
             </a:pPr>
-            <a:endParaRPr lang="en-US" sz="1200" dirty="0"/>
+            <a:endParaRPr lang="en-US" sz="1600" dirty="0"/>
           </a:p>
           <a:p>
             <a:pPr marL="228600" lvl="1">
@@ -5750,25 +5730,8 @@
             </a:pPr>
             <a:r>
               <a:rPr lang="en-US" sz="1800" dirty="0"/>
-              <a:t>Since this is a constrained optimization technique, you must specify the bounds for each parameter for it to work</a:t>
-            </a:r>
-          </a:p>
-          <a:p>
-            <a:pPr marL="228600" lvl="1">
-              <a:spcBef>
-                <a:spcPts val="1000"/>
-              </a:spcBef>
-            </a:pPr>
-            <a:r>
-              <a:rPr lang="en-US" sz="1800" dirty="0"/>
-              <a:t>The processing time can be longer if the user chooses to tune the hyper-parameters to obtain more accuracy in the output</a:t>
-            </a:r>
-          </a:p>
-          <a:p>
-            <a:pPr marL="457200" lvl="1" indent="0">
-              <a:buNone/>
-            </a:pPr>
-            <a:endParaRPr lang="en-US" sz="1400" dirty="0"/>
+              <a:t>Although this package is quite effective as is, the user has the ability to tune available hyperparameters to obtain more accuracy in the output; however, this can increase the processing time</a:t>
+            </a:r>
           </a:p>
         </p:txBody>
       </p:sp>
@@ -6151,104 +6114,6 @@
           <p:cNvPr id="2" name="Title 1">
             <a:extLst>
               <a:ext uri="{FF2B5EF4-FFF2-40B4-BE49-F238E27FC236}">
-                <a16:creationId xmlns:a16="http://schemas.microsoft.com/office/drawing/2014/main" id="{BA6BDF95-063C-3440-BF4D-8E56258A99E8}"/>
-              </a:ext>
-            </a:extLst>
-          </p:cNvPr>
-          <p:cNvSpPr>
-            <a:spLocks noGrp="1"/>
-          </p:cNvSpPr>
-          <p:nvPr>
-            <p:ph type="title"/>
-          </p:nvPr>
-        </p:nvSpPr>
-        <p:spPr/>
-        <p:txBody>
-          <a:bodyPr/>
-          <a:lstStyle/>
-          <a:p>
-            <a:r>
-              <a:rPr lang="en-US" dirty="0"/>
-              <a:t>Drawbacks</a:t>
-            </a:r>
-          </a:p>
-        </p:txBody>
-      </p:sp>
-      <p:sp>
-        <p:nvSpPr>
-          <p:cNvPr id="3" name="Content Placeholder 2">
-            <a:extLst>
-              <a:ext uri="{FF2B5EF4-FFF2-40B4-BE49-F238E27FC236}">
-                <a16:creationId xmlns:a16="http://schemas.microsoft.com/office/drawing/2014/main" id="{DF85370D-4764-934F-B682-D8F4E82E76EB}"/>
-              </a:ext>
-            </a:extLst>
-          </p:cNvPr>
-          <p:cNvSpPr>
-            <a:spLocks noGrp="1"/>
-          </p:cNvSpPr>
-          <p:nvPr>
-            <p:ph idx="1"/>
-          </p:nvPr>
-        </p:nvSpPr>
-        <p:spPr/>
-        <p:txBody>
-          <a:bodyPr/>
-          <a:lstStyle/>
-          <a:p>
-            <a:r>
-              <a:rPr lang="en-US" dirty="0"/>
-              <a:t>Results are sensitive to hyper parameters which underestimates uncertainty</a:t>
-            </a:r>
-          </a:p>
-          <a:p>
-            <a:r>
-              <a:rPr lang="en-US" dirty="0"/>
-              <a:t>The objective is a complex function which is expensive and timely to evaluate</a:t>
-            </a:r>
-          </a:p>
-          <a:p>
-            <a:r>
-              <a:rPr lang="en-US" dirty="0"/>
-              <a:t>The outcome are not the exact optimum (not accurate)</a:t>
-            </a:r>
-          </a:p>
-        </p:txBody>
-      </p:sp>
-    </p:spTree>
-    <p:extLst>
-      <p:ext uri="{BB962C8B-B14F-4D97-AF65-F5344CB8AC3E}">
-        <p14:creationId xmlns:p14="http://schemas.microsoft.com/office/powerpoint/2010/main" val="4072473980"/>
-      </p:ext>
-    </p:extLst>
-  </p:cSld>
-  <p:clrMapOvr>
-    <a:masterClrMapping/>
-  </p:clrMapOvr>
-</p:sld>
-</file>
-
-<file path=ppt/slides/slide7.xml><?xml version="1.0" encoding="utf-8"?>
-<p:sld xmlns:a="http://schemas.openxmlformats.org/drawingml/2006/main" xmlns:r="http://schemas.openxmlformats.org/officeDocument/2006/relationships" xmlns:p="http://schemas.openxmlformats.org/presentationml/2006/main">
-  <p:cSld>
-    <p:spTree>
-      <p:nvGrpSpPr>
-        <p:cNvPr id="1" name=""/>
-        <p:cNvGrpSpPr/>
-        <p:nvPr/>
-      </p:nvGrpSpPr>
-      <p:grpSpPr>
-        <a:xfrm>
-          <a:off x="0" y="0"/>
-          <a:ext cx="0" cy="0"/>
-          <a:chOff x="0" y="0"/>
-          <a:chExt cx="0" cy="0"/>
-        </a:xfrm>
-      </p:grpSpPr>
-      <p:sp>
-        <p:nvSpPr>
-          <p:cNvPr id="2" name="Title 1">
-            <a:extLst>
-              <a:ext uri="{FF2B5EF4-FFF2-40B4-BE49-F238E27FC236}">
                 <a16:creationId xmlns:a16="http://schemas.microsoft.com/office/drawing/2014/main" id="{D4BDF1A1-7256-6847-900A-D8F01E76FB78}"/>
               </a:ext>
             </a:extLst>
@@ -6351,7 +6216,7 @@
 </p:sld>
 </file>
 
-<file path=ppt/slides/slide8.xml><?xml version="1.0" encoding="utf-8"?>
+<file path=ppt/slides/slide7.xml><?xml version="1.0" encoding="utf-8"?>
 <p:sld xmlns:a="http://schemas.openxmlformats.org/drawingml/2006/main" xmlns:r="http://schemas.openxmlformats.org/officeDocument/2006/relationships" xmlns:p="http://schemas.openxmlformats.org/presentationml/2006/main">
   <p:cSld>
     <p:spTree>

</xml_diff>